<commit_message>
Minor update to slides 2016
</commit_message>
<xml_diff>
--- a/2016-2017/Presentations/CrashCourse_2016.pptx
+++ b/2016-2017/Presentations/CrashCourse_2016.pptx
@@ -269,7 +269,7 @@
               <a:pPr>
                 <a:defRPr/>
               </a:pPr>
-              <a:t>10/10/2016</a:t>
+              <a:t>12/10/2016</a:t>
             </a:fld>
             <a:endParaRPr lang="en-GB"/>
           </a:p>
@@ -1822,7 +1822,7 @@
             <a:fld id="{C4DDCD72-59EE-436D-B435-201699A5BB49}" type="datetimeFigureOut">
               <a:rPr lang="nl-BE" smtClean="0"/>
               <a:pPr/>
-              <a:t>10/10/2016</a:t>
+              <a:t>12/10/2016</a:t>
             </a:fld>
             <a:endParaRPr lang="nl-BE" dirty="0"/>
           </a:p>
@@ -2511,7 +2511,7 @@
             <a:fld id="{C4DDCD72-59EE-436D-B435-201699A5BB49}" type="datetimeFigureOut">
               <a:rPr lang="nl-BE" smtClean="0"/>
               <a:pPr/>
-              <a:t>10/10/2016</a:t>
+              <a:t>12/10/2016</a:t>
             </a:fld>
             <a:endParaRPr lang="nl-BE"/>
           </a:p>
@@ -2950,7 +2950,7 @@
             <a:fld id="{C4DDCD72-59EE-436D-B435-201699A5BB49}" type="datetimeFigureOut">
               <a:rPr lang="nl-BE" smtClean="0"/>
               <a:pPr/>
-              <a:t>10/10/2016</a:t>
+              <a:t>12/10/2016</a:t>
             </a:fld>
             <a:endParaRPr lang="nl-BE"/>
           </a:p>
@@ -3081,7 +3081,7 @@
             <a:fld id="{C4DDCD72-59EE-436D-B435-201699A5BB49}" type="datetimeFigureOut">
               <a:rPr lang="nl-BE" smtClean="0"/>
               <a:pPr/>
-              <a:t>10/10/2016</a:t>
+              <a:t>12/10/2016</a:t>
             </a:fld>
             <a:endParaRPr lang="nl-BE"/>
           </a:p>
@@ -3185,7 +3185,7 @@
             <a:fld id="{C4DDCD72-59EE-436D-B435-201699A5BB49}" type="datetimeFigureOut">
               <a:rPr lang="nl-BE" smtClean="0"/>
               <a:pPr/>
-              <a:t>10/10/2016</a:t>
+              <a:t>12/10/2016</a:t>
             </a:fld>
             <a:endParaRPr lang="nl-BE"/>
           </a:p>
@@ -3478,7 +3478,7 @@
             <a:fld id="{C4DDCD72-59EE-436D-B435-201699A5BB49}" type="datetimeFigureOut">
               <a:rPr lang="nl-BE" smtClean="0"/>
               <a:pPr/>
-              <a:t>10/10/2016</a:t>
+              <a:t>12/10/2016</a:t>
             </a:fld>
             <a:endParaRPr lang="nl-BE"/>
           </a:p>
@@ -3609,7 +3609,7 @@
             <a:fld id="{C4DDCD72-59EE-436D-B435-201699A5BB49}" type="datetimeFigureOut">
               <a:rPr lang="nl-BE" smtClean="0"/>
               <a:pPr/>
-              <a:t>10/10/2016</a:t>
+              <a:t>12/10/2016</a:t>
             </a:fld>
             <a:endParaRPr lang="nl-BE" dirty="0"/>
           </a:p>
@@ -4008,7 +4008,7 @@
             <a:fld id="{C4DDCD72-59EE-436D-B435-201699A5BB49}" type="datetimeFigureOut">
               <a:rPr lang="nl-BE" smtClean="0"/>
               <a:pPr/>
-              <a:t>10/10/2016</a:t>
+              <a:t>12/10/2016</a:t>
             </a:fld>
             <a:endParaRPr lang="nl-BE" dirty="0"/>
           </a:p>
@@ -4571,7 +4571,7 @@
             <a:fld id="{C4DDCD72-59EE-436D-B435-201699A5BB49}" type="datetimeFigureOut">
               <a:rPr lang="nl-BE" smtClean="0"/>
               <a:pPr/>
-              <a:t>10/10/2016</a:t>
+              <a:t>12/10/2016</a:t>
             </a:fld>
             <a:endParaRPr lang="nl-BE"/>
           </a:p>
@@ -5010,7 +5010,7 @@
             <a:fld id="{C4DDCD72-59EE-436D-B435-201699A5BB49}" type="datetimeFigureOut">
               <a:rPr lang="nl-BE" smtClean="0"/>
               <a:pPr/>
-              <a:t>10/10/2016</a:t>
+              <a:t>12/10/2016</a:t>
             </a:fld>
             <a:endParaRPr lang="nl-BE"/>
           </a:p>
@@ -5141,7 +5141,7 @@
             <a:fld id="{C4DDCD72-59EE-436D-B435-201699A5BB49}" type="datetimeFigureOut">
               <a:rPr lang="nl-BE" smtClean="0"/>
               <a:pPr/>
-              <a:t>10/10/2016</a:t>
+              <a:t>12/10/2016</a:t>
             </a:fld>
             <a:endParaRPr lang="nl-BE"/>
           </a:p>
@@ -5245,7 +5245,7 @@
             <a:fld id="{C4DDCD72-59EE-436D-B435-201699A5BB49}" type="datetimeFigureOut">
               <a:rPr lang="nl-BE" smtClean="0"/>
               <a:pPr/>
-              <a:t>10/10/2016</a:t>
+              <a:t>12/10/2016</a:t>
             </a:fld>
             <a:endParaRPr lang="nl-BE"/>
           </a:p>
@@ -5534,7 +5534,7 @@
             <a:fld id="{C4DDCD72-59EE-436D-B435-201699A5BB49}" type="datetimeFigureOut">
               <a:rPr lang="nl-BE" smtClean="0"/>
               <a:pPr/>
-              <a:t>10/10/2016</a:t>
+              <a:t>12/10/2016</a:t>
             </a:fld>
             <a:endParaRPr lang="nl-BE"/>
           </a:p>
@@ -5807,7 +5807,7 @@
             <a:fld id="{C4DDCD72-59EE-436D-B435-201699A5BB49}" type="datetimeFigureOut">
               <a:rPr lang="nl-BE" smtClean="0"/>
               <a:pPr/>
-              <a:t>10/10/2016</a:t>
+              <a:t>12/10/2016</a:t>
             </a:fld>
             <a:endParaRPr lang="nl-BE" dirty="0"/>
           </a:p>
@@ -6034,7 +6034,7 @@
             <a:fld id="{C4DDCD72-59EE-436D-B435-201699A5BB49}" type="datetimeFigureOut">
               <a:rPr lang="nl-BE" smtClean="0"/>
               <a:pPr/>
-              <a:t>10/10/2016</a:t>
+              <a:t>12/10/2016</a:t>
             </a:fld>
             <a:endParaRPr lang="nl-BE" dirty="0"/>
           </a:p>
@@ -6662,7 +6662,7 @@
             <a:fld id="{C4DDCD72-59EE-436D-B435-201699A5BB49}" type="datetimeFigureOut">
               <a:rPr lang="nl-BE" smtClean="0"/>
               <a:pPr/>
-              <a:t>10/10/2016</a:t>
+              <a:t>12/10/2016</a:t>
             </a:fld>
             <a:endParaRPr lang="nl-BE" dirty="0"/>
           </a:p>
@@ -8215,7 +8215,11 @@
             <a:pPr lvl="1"/>
             <a:r>
               <a:rPr lang="en-GB" dirty="0" smtClean="0"/>
-              <a:t>and, or, not</a:t>
+              <a:t>and, or, </a:t>
+            </a:r>
+            <a:r>
+              <a:rPr lang="en-GB" dirty="0" smtClean="0"/>
+              <a:t>not</a:t>
             </a:r>
           </a:p>
           <a:p>
@@ -8223,6 +8227,7 @@
               <a:rPr lang="en-GB" dirty="0" smtClean="0"/>
               <a:t>Conditional</a:t>
             </a:r>
+            <a:endParaRPr lang="en-GB" dirty="0" smtClean="0"/>
           </a:p>
           <a:p>
             <a:pPr lvl="1"/>
@@ -8253,8 +8258,22 @@
             <a:pPr lvl="1"/>
             <a:r>
               <a:rPr lang="en-GB" dirty="0" smtClean="0"/>
-              <a:t>for</a:t>
-            </a:r>
+              <a:t>For</a:t>
+            </a:r>
+          </a:p>
+          <a:p>
+            <a:r>
+              <a:rPr lang="en-GB" dirty="0" smtClean="0"/>
+              <a:t>Comparing numbers</a:t>
+            </a:r>
+          </a:p>
+          <a:p>
+            <a:pPr lvl="1"/>
+            <a:r>
+              <a:rPr lang="en-GB" dirty="0" smtClean="0"/>
+              <a:t>&gt;, &lt;, &lt;&gt;, &gt;=,…</a:t>
+            </a:r>
+            <a:endParaRPr lang="en-GB" dirty="0" smtClean="0"/>
           </a:p>
         </p:txBody>
       </p:sp>
@@ -13647,8 +13666,8 @@
           </a:p>
         </p:txBody>
       </p:sp>
-      <mc:AlternateContent xmlns:mc="http://schemas.openxmlformats.org/markup-compatibility/2006" xmlns:a14="http://schemas.microsoft.com/office/drawing/2010/main">
-        <mc:Choice Requires="a14">
+      <mc:AlternateContent xmlns:mc="http://schemas.openxmlformats.org/markup-compatibility/2006">
+        <mc:Choice xmlns:a14="http://schemas.microsoft.com/office/drawing/2010/main" Requires="a14">
           <p:sp>
             <p:nvSpPr>
               <p:cNvPr id="3" name="Content Placeholder 2"/>
@@ -13666,11 +13685,23 @@
               <a:p>
                 <a:r>
                   <a:rPr lang="en-GB" b="1" dirty="0" smtClean="0"/>
-                  <a:t>Compiles</a:t>
+                  <a:t>Compiles </a:t>
+                </a:r>
+                <a:r>
+                  <a:rPr lang="en-GB" smtClean="0"/>
+                  <a:t>and </a:t>
+                </a:r>
+                <a:r>
+                  <a:rPr lang="en-GB" b="1" smtClean="0"/>
+                  <a:t>integrates</a:t>
+                </a:r>
+                <a:r>
+                  <a:rPr lang="en-GB" smtClean="0"/>
+                  <a:t> </a:t>
                 </a:r>
                 <a:r>
                   <a:rPr lang="en-GB" dirty="0" smtClean="0"/>
-                  <a:t> equations</a:t>
+                  <a:t>equations</a:t>
                 </a:r>
               </a:p>
               <a:p>
@@ -14011,7 +14042,7 @@
             </p:txBody>
           </p:sp>
         </mc:Choice>
-        <mc:Fallback xmlns="">
+        <mc:Fallback>
           <p:sp>
             <p:nvSpPr>
               <p:cNvPr id="3" name="Content Placeholder 2"/>

</xml_diff>